<commit_message>
delete JSON file, midified of presentation
</commit_message>
<xml_diff>
--- a/ProjectSportaPresentation.pptx
+++ b/ProjectSportaPresentation.pptx
@@ -291,7 +291,7 @@
             <a:fld id="{1D8BD707-D9CF-40AE-B4C6-C98DA3205C09}" type="datetimeFigureOut">
               <a:rPr lang="en-US" smtClean="0"/>
               <a:pPr/>
-              <a:t>14-Jan-20</a:t>
+              <a:t>15-Jan-20</a:t>
             </a:fld>
             <a:endParaRPr lang="en-US"/>
           </a:p>
@@ -458,7 +458,7 @@
             <a:fld id="{1D8BD707-D9CF-40AE-B4C6-C98DA3205C09}" type="datetimeFigureOut">
               <a:rPr lang="en-US" smtClean="0"/>
               <a:pPr/>
-              <a:t>14-Jan-20</a:t>
+              <a:t>15-Jan-20</a:t>
             </a:fld>
             <a:endParaRPr lang="en-US"/>
           </a:p>
@@ -635,7 +635,7 @@
             <a:fld id="{1D8BD707-D9CF-40AE-B4C6-C98DA3205C09}" type="datetimeFigureOut">
               <a:rPr lang="en-US" smtClean="0"/>
               <a:pPr/>
-              <a:t>14-Jan-20</a:t>
+              <a:t>15-Jan-20</a:t>
             </a:fld>
             <a:endParaRPr lang="en-US"/>
           </a:p>
@@ -802,7 +802,7 @@
             <a:fld id="{1D8BD707-D9CF-40AE-B4C6-C98DA3205C09}" type="datetimeFigureOut">
               <a:rPr lang="en-US" smtClean="0"/>
               <a:pPr/>
-              <a:t>14-Jan-20</a:t>
+              <a:t>15-Jan-20</a:t>
             </a:fld>
             <a:endParaRPr lang="en-US"/>
           </a:p>
@@ -1046,7 +1046,7 @@
             <a:fld id="{1D8BD707-D9CF-40AE-B4C6-C98DA3205C09}" type="datetimeFigureOut">
               <a:rPr lang="en-US" smtClean="0"/>
               <a:pPr/>
-              <a:t>14-Jan-20</a:t>
+              <a:t>15-Jan-20</a:t>
             </a:fld>
             <a:endParaRPr lang="en-US"/>
           </a:p>
@@ -1312,7 +1312,7 @@
             <a:fld id="{1D8BD707-D9CF-40AE-B4C6-C98DA3205C09}" type="datetimeFigureOut">
               <a:rPr lang="en-US" smtClean="0"/>
               <a:pPr/>
-              <a:t>14-Jan-20</a:t>
+              <a:t>15-Jan-20</a:t>
             </a:fld>
             <a:endParaRPr lang="en-US"/>
           </a:p>
@@ -1692,7 +1692,7 @@
             <a:fld id="{1D8BD707-D9CF-40AE-B4C6-C98DA3205C09}" type="datetimeFigureOut">
               <a:rPr lang="en-US" smtClean="0"/>
               <a:pPr/>
-              <a:t>14-Jan-20</a:t>
+              <a:t>15-Jan-20</a:t>
             </a:fld>
             <a:endParaRPr lang="en-US"/>
           </a:p>
@@ -1844,7 +1844,7 @@
             <a:fld id="{1D8BD707-D9CF-40AE-B4C6-C98DA3205C09}" type="datetimeFigureOut">
               <a:rPr lang="en-US" smtClean="0"/>
               <a:pPr/>
-              <a:t>14-Jan-20</a:t>
+              <a:t>15-Jan-20</a:t>
             </a:fld>
             <a:endParaRPr lang="en-US"/>
           </a:p>
@@ -1936,7 +1936,7 @@
             <a:fld id="{1D8BD707-D9CF-40AE-B4C6-C98DA3205C09}" type="datetimeFigureOut">
               <a:rPr lang="en-US" smtClean="0"/>
               <a:pPr/>
-              <a:t>14-Jan-20</a:t>
+              <a:t>15-Jan-20</a:t>
             </a:fld>
             <a:endParaRPr lang="en-US"/>
           </a:p>
@@ -2199,7 +2199,7 @@
             <a:fld id="{1D8BD707-D9CF-40AE-B4C6-C98DA3205C09}" type="datetimeFigureOut">
               <a:rPr lang="en-US" smtClean="0"/>
               <a:pPr/>
-              <a:t>14-Jan-20</a:t>
+              <a:t>15-Jan-20</a:t>
             </a:fld>
             <a:endParaRPr lang="en-US"/>
           </a:p>
@@ -2489,7 +2489,7 @@
             <a:fld id="{1D8BD707-D9CF-40AE-B4C6-C98DA3205C09}" type="datetimeFigureOut">
               <a:rPr lang="en-US" smtClean="0"/>
               <a:pPr/>
-              <a:t>14-Jan-20</a:t>
+              <a:t>15-Jan-20</a:t>
             </a:fld>
             <a:endParaRPr lang="en-US"/>
           </a:p>
@@ -3262,7 +3262,7 @@
             <a:fld id="{1D8BD707-D9CF-40AE-B4C6-C98DA3205C09}" type="datetimeFigureOut">
               <a:rPr lang="en-US" smtClean="0"/>
               <a:pPr/>
-              <a:t>14-Jan-20</a:t>
+              <a:t>15-Jan-20</a:t>
             </a:fld>
             <a:endParaRPr lang="en-US"/>
           </a:p>
@@ -6351,7 +6351,7 @@
       </p:sp>
       <p:pic>
         <p:nvPicPr>
-          <p:cNvPr id="6" name="Picture 5" descr="Screen Clipping"/>
+          <p:cNvPr id="8" name="Picture 7" descr="Screen Clipping"/>
           <p:cNvPicPr>
             <a:picLocks noChangeAspect="1"/>
           </p:cNvPicPr>
@@ -6371,37 +6371,7 @@
         </p:blipFill>
         <p:spPr>
           <a:xfrm>
-            <a:off x="2086970" y="761856"/>
-            <a:ext cx="1952898" cy="1533739"/>
-          </a:xfrm>
-          <a:prstGeom prst="rect">
-            <a:avLst/>
-          </a:prstGeom>
-        </p:spPr>
-      </p:pic>
-      <p:pic>
-        <p:nvPicPr>
-          <p:cNvPr id="8" name="Picture 7" descr="Screen Clipping"/>
-          <p:cNvPicPr>
-            <a:picLocks noChangeAspect="1"/>
-          </p:cNvPicPr>
-          <p:nvPr/>
-        </p:nvPicPr>
-        <p:blipFill>
-          <a:blip r:embed="rId3">
-            <a:extLst>
-              <a:ext uri="{28A0092B-C50C-407E-A947-70E740481C1C}">
-                <a14:useLocalDpi xmlns:a14="http://schemas.microsoft.com/office/drawing/2010/main" val="0"/>
-              </a:ext>
-            </a:extLst>
-          </a:blip>
-          <a:stretch>
-            <a:fillRect/>
-          </a:stretch>
-        </p:blipFill>
-        <p:spPr>
-          <a:xfrm>
-            <a:off x="4114800" y="790361"/>
+            <a:off x="2002979" y="838983"/>
             <a:ext cx="1886213" cy="1514687"/>
           </a:xfrm>
           <a:prstGeom prst="rect">
@@ -7179,7 +7149,7 @@
           <p:nvPr/>
         </p:nvPicPr>
         <p:blipFill>
-          <a:blip r:embed="rId4">
+          <a:blip r:embed="rId3">
             <a:extLst>
               <a:ext uri="{28A0092B-C50C-407E-A947-70E740481C1C}">
                 <a14:useLocalDpi xmlns:a14="http://schemas.microsoft.com/office/drawing/2010/main" val="0"/>
@@ -7209,7 +7179,7 @@
           <p:nvPr/>
         </p:nvPicPr>
         <p:blipFill>
-          <a:blip r:embed="rId5">
+          <a:blip r:embed="rId4">
             <a:extLst>
               <a:ext uri="{28A0092B-C50C-407E-A947-70E740481C1C}">
                 <a14:useLocalDpi xmlns:a14="http://schemas.microsoft.com/office/drawing/2010/main" val="0"/>
@@ -7232,7 +7202,37 @@
       </p:pic>
       <p:pic>
         <p:nvPicPr>
-          <p:cNvPr id="5" name="Picture 4" descr="Screen Clipping"/>
+          <p:cNvPr id="9" name="Picture 8" descr="Screen Clipping"/>
+          <p:cNvPicPr>
+            <a:picLocks noChangeAspect="1"/>
+          </p:cNvPicPr>
+          <p:nvPr/>
+        </p:nvPicPr>
+        <p:blipFill>
+          <a:blip r:embed="rId5">
+            <a:extLst>
+              <a:ext uri="{28A0092B-C50C-407E-A947-70E740481C1C}">
+                <a14:useLocalDpi xmlns:a14="http://schemas.microsoft.com/office/drawing/2010/main" val="0"/>
+              </a:ext>
+            </a:extLst>
+          </a:blip>
+          <a:stretch>
+            <a:fillRect/>
+          </a:stretch>
+        </p:blipFill>
+        <p:spPr>
+          <a:xfrm>
+            <a:off x="2002979" y="2590800"/>
+            <a:ext cx="2295846" cy="1811940"/>
+          </a:xfrm>
+          <a:prstGeom prst="rect">
+            <a:avLst/>
+          </a:prstGeom>
+        </p:spPr>
+      </p:pic>
+      <p:pic>
+        <p:nvPicPr>
+          <p:cNvPr id="13" name="Picture 12" descr="Screen Clipping"/>
           <p:cNvPicPr>
             <a:picLocks noChangeAspect="1"/>
           </p:cNvPicPr>
@@ -7252,38 +7252,8 @@
         </p:blipFill>
         <p:spPr>
           <a:xfrm>
-            <a:off x="1929785" y="2497680"/>
-            <a:ext cx="2267267" cy="1905060"/>
-          </a:xfrm>
-          <a:prstGeom prst="rect">
-            <a:avLst/>
-          </a:prstGeom>
-        </p:spPr>
-      </p:pic>
-      <p:pic>
-        <p:nvPicPr>
-          <p:cNvPr id="7" name="Picture 6" descr="Screen Clipping"/>
-          <p:cNvPicPr>
-            <a:picLocks noChangeAspect="1"/>
-          </p:cNvPicPr>
-          <p:nvPr/>
-        </p:nvPicPr>
-        <p:blipFill>
-          <a:blip r:embed="rId7">
-            <a:extLst>
-              <a:ext uri="{28A0092B-C50C-407E-A947-70E740481C1C}">
-                <a14:useLocalDpi xmlns:a14="http://schemas.microsoft.com/office/drawing/2010/main" val="0"/>
-              </a:ext>
-            </a:extLst>
-          </a:blip>
-          <a:stretch>
-            <a:fillRect/>
-          </a:stretch>
-        </p:blipFill>
-        <p:spPr>
-          <a:xfrm>
-            <a:off x="3673080" y="4958330"/>
-            <a:ext cx="1590897" cy="1913457"/>
+            <a:off x="3771023" y="4963368"/>
+            <a:ext cx="1619476" cy="1894632"/>
           </a:xfrm>
           <a:prstGeom prst="rect">
             <a:avLst/>
@@ -7608,7 +7578,7 @@
       </p:pic>
       <p:pic>
         <p:nvPicPr>
-          <p:cNvPr id="6" name="Picture 5" descr="Screen Clipping"/>
+          <p:cNvPr id="10" name="Picture 9" descr="Screen Clipping"/>
           <p:cNvPicPr>
             <a:picLocks noChangeAspect="1"/>
           </p:cNvPicPr>
@@ -7628,8 +7598,8 @@
         </p:blipFill>
         <p:spPr>
           <a:xfrm>
-            <a:off x="1017765" y="1903185"/>
-            <a:ext cx="2032510" cy="743032"/>
+            <a:off x="1017765" y="41146"/>
+            <a:ext cx="2030232" cy="1787653"/>
           </a:xfrm>
           <a:prstGeom prst="rect">
             <a:avLst/>
@@ -7638,7 +7608,7 @@
       </p:pic>
       <p:pic>
         <p:nvPicPr>
-          <p:cNvPr id="10" name="Picture 9" descr="Screen Clipping"/>
+          <p:cNvPr id="2" name="Picture 1" descr="Screen Clipping"/>
           <p:cNvPicPr>
             <a:picLocks noChangeAspect="1"/>
           </p:cNvPicPr>
@@ -7658,8 +7628,8 @@
         </p:blipFill>
         <p:spPr>
           <a:xfrm>
-            <a:off x="1017765" y="41146"/>
-            <a:ext cx="2030232" cy="1787653"/>
+            <a:off x="1031620" y="1946563"/>
+            <a:ext cx="1838582" cy="734290"/>
           </a:xfrm>
           <a:prstGeom prst="rect">
             <a:avLst/>

</xml_diff>

<commit_message>
added mathod for addPictureToArticle, final modification
</commit_message>
<xml_diff>
--- a/ProjectSportaPresentation.pptx
+++ b/ProjectSportaPresentation.pptx
@@ -14,8 +14,9 @@
     <p:sldId id="260" r:id="rId8"/>
     <p:sldId id="267" r:id="rId9"/>
     <p:sldId id="262" r:id="rId10"/>
-    <p:sldId id="265" r:id="rId11"/>
-    <p:sldId id="266" r:id="rId12"/>
+    <p:sldId id="268" r:id="rId11"/>
+    <p:sldId id="265" r:id="rId12"/>
+    <p:sldId id="266" r:id="rId13"/>
   </p:sldIdLst>
   <p:sldSz cx="9144000" cy="6858000" type="screen4x3"/>
   <p:notesSz cx="6858000" cy="9144000"/>
@@ -291,7 +292,7 @@
             <a:fld id="{1D8BD707-D9CF-40AE-B4C6-C98DA3205C09}" type="datetimeFigureOut">
               <a:rPr lang="en-US" smtClean="0"/>
               <a:pPr/>
-              <a:t>15-Jan-20</a:t>
+              <a:t>16-Jan-20</a:t>
             </a:fld>
             <a:endParaRPr lang="en-US"/>
           </a:p>
@@ -458,7 +459,7 @@
             <a:fld id="{1D8BD707-D9CF-40AE-B4C6-C98DA3205C09}" type="datetimeFigureOut">
               <a:rPr lang="en-US" smtClean="0"/>
               <a:pPr/>
-              <a:t>15-Jan-20</a:t>
+              <a:t>16-Jan-20</a:t>
             </a:fld>
             <a:endParaRPr lang="en-US"/>
           </a:p>
@@ -635,7 +636,7 @@
             <a:fld id="{1D8BD707-D9CF-40AE-B4C6-C98DA3205C09}" type="datetimeFigureOut">
               <a:rPr lang="en-US" smtClean="0"/>
               <a:pPr/>
-              <a:t>15-Jan-20</a:t>
+              <a:t>16-Jan-20</a:t>
             </a:fld>
             <a:endParaRPr lang="en-US"/>
           </a:p>
@@ -802,7 +803,7 @@
             <a:fld id="{1D8BD707-D9CF-40AE-B4C6-C98DA3205C09}" type="datetimeFigureOut">
               <a:rPr lang="en-US" smtClean="0"/>
               <a:pPr/>
-              <a:t>15-Jan-20</a:t>
+              <a:t>16-Jan-20</a:t>
             </a:fld>
             <a:endParaRPr lang="en-US"/>
           </a:p>
@@ -1046,7 +1047,7 @@
             <a:fld id="{1D8BD707-D9CF-40AE-B4C6-C98DA3205C09}" type="datetimeFigureOut">
               <a:rPr lang="en-US" smtClean="0"/>
               <a:pPr/>
-              <a:t>15-Jan-20</a:t>
+              <a:t>16-Jan-20</a:t>
             </a:fld>
             <a:endParaRPr lang="en-US"/>
           </a:p>
@@ -1312,7 +1313,7 @@
             <a:fld id="{1D8BD707-D9CF-40AE-B4C6-C98DA3205C09}" type="datetimeFigureOut">
               <a:rPr lang="en-US" smtClean="0"/>
               <a:pPr/>
-              <a:t>15-Jan-20</a:t>
+              <a:t>16-Jan-20</a:t>
             </a:fld>
             <a:endParaRPr lang="en-US"/>
           </a:p>
@@ -1692,7 +1693,7 @@
             <a:fld id="{1D8BD707-D9CF-40AE-B4C6-C98DA3205C09}" type="datetimeFigureOut">
               <a:rPr lang="en-US" smtClean="0"/>
               <a:pPr/>
-              <a:t>15-Jan-20</a:t>
+              <a:t>16-Jan-20</a:t>
             </a:fld>
             <a:endParaRPr lang="en-US"/>
           </a:p>
@@ -1844,7 +1845,7 @@
             <a:fld id="{1D8BD707-D9CF-40AE-B4C6-C98DA3205C09}" type="datetimeFigureOut">
               <a:rPr lang="en-US" smtClean="0"/>
               <a:pPr/>
-              <a:t>15-Jan-20</a:t>
+              <a:t>16-Jan-20</a:t>
             </a:fld>
             <a:endParaRPr lang="en-US"/>
           </a:p>
@@ -1936,7 +1937,7 @@
             <a:fld id="{1D8BD707-D9CF-40AE-B4C6-C98DA3205C09}" type="datetimeFigureOut">
               <a:rPr lang="en-US" smtClean="0"/>
               <a:pPr/>
-              <a:t>15-Jan-20</a:t>
+              <a:t>16-Jan-20</a:t>
             </a:fld>
             <a:endParaRPr lang="en-US"/>
           </a:p>
@@ -2199,7 +2200,7 @@
             <a:fld id="{1D8BD707-D9CF-40AE-B4C6-C98DA3205C09}" type="datetimeFigureOut">
               <a:rPr lang="en-US" smtClean="0"/>
               <a:pPr/>
-              <a:t>15-Jan-20</a:t>
+              <a:t>16-Jan-20</a:t>
             </a:fld>
             <a:endParaRPr lang="en-US"/>
           </a:p>
@@ -2489,7 +2490,7 @@
             <a:fld id="{1D8BD707-D9CF-40AE-B4C6-C98DA3205C09}" type="datetimeFigureOut">
               <a:rPr lang="en-US" smtClean="0"/>
               <a:pPr/>
-              <a:t>15-Jan-20</a:t>
+              <a:t>16-Jan-20</a:t>
             </a:fld>
             <a:endParaRPr lang="en-US"/>
           </a:p>
@@ -3262,7 +3263,7 @@
             <a:fld id="{1D8BD707-D9CF-40AE-B4C6-C98DA3205C09}" type="datetimeFigureOut">
               <a:rPr lang="en-US" smtClean="0"/>
               <a:pPr/>
-              <a:t>15-Jan-20</a:t>
+              <a:t>16-Jan-20</a:t>
             </a:fld>
             <a:endParaRPr lang="en-US"/>
           </a:p>
@@ -4215,6 +4216,100 @@
       </p:grpSpPr>
       <p:sp>
         <p:nvSpPr>
+          <p:cNvPr id="3" name="Subtitle 2"/>
+          <p:cNvSpPr>
+            <a:spLocks noGrp="1"/>
+          </p:cNvSpPr>
+          <p:nvPr>
+            <p:ph type="subTitle" idx="1"/>
+          </p:nvPr>
+        </p:nvSpPr>
+        <p:spPr>
+          <a:xfrm>
+            <a:off x="533400" y="990600"/>
+            <a:ext cx="7854696" cy="3657600"/>
+          </a:xfrm>
+        </p:spPr>
+        <p:txBody>
+          <a:bodyPr>
+            <a:normAutofit/>
+          </a:bodyPr>
+          <a:lstStyle/>
+          <a:p>
+            <a:pPr algn="ctr"/>
+            <a:r>
+              <a:rPr lang="en-US" sz="4000" dirty="0" smtClean="0"/>
+              <a:t>~ 2800 lines of code</a:t>
+            </a:r>
+          </a:p>
+          <a:p>
+            <a:pPr algn="ctr"/>
+            <a:r>
+              <a:rPr lang="en-US" sz="4000" dirty="0" smtClean="0"/>
+              <a:t>~ 265 hours</a:t>
+            </a:r>
+          </a:p>
+          <a:p>
+            <a:pPr algn="ctr"/>
+            <a:r>
+              <a:rPr lang="en-US" sz="4000" dirty="0"/>
+              <a:t>~</a:t>
+            </a:r>
+            <a:r>
+              <a:rPr lang="en-US" sz="4000" dirty="0" smtClean="0"/>
+              <a:t> 29 days</a:t>
+            </a:r>
+          </a:p>
+          <a:p>
+            <a:pPr algn="ctr"/>
+            <a:r>
+              <a:rPr lang="en-US" sz="4000" dirty="0"/>
+              <a:t>~</a:t>
+            </a:r>
+            <a:r>
+              <a:rPr lang="en-US" sz="4000" smtClean="0"/>
+              <a:t> </a:t>
+            </a:r>
+            <a:r>
+              <a:rPr lang="en-US" sz="4000" dirty="0" smtClean="0"/>
+              <a:t>9 average hours/day</a:t>
+            </a:r>
+            <a:endParaRPr lang="bg-BG" sz="4000" dirty="0"/>
+          </a:p>
+        </p:txBody>
+      </p:sp>
+    </p:spTree>
+    <p:extLst>
+      <p:ext uri="{BB962C8B-B14F-4D97-AF65-F5344CB8AC3E}">
+        <p14:creationId xmlns:p14="http://schemas.microsoft.com/office/powerpoint/2010/main" val="3024878356"/>
+      </p:ext>
+    </p:extLst>
+  </p:cSld>
+  <p:clrMapOvr>
+    <a:masterClrMapping/>
+  </p:clrMapOvr>
+</p:sld>
+</file>
+
+<file path=ppt/slides/slide11.xml><?xml version="1.0" encoding="utf-8"?>
+<p:sld xmlns:a="http://schemas.openxmlformats.org/drawingml/2006/main" xmlns:r="http://schemas.openxmlformats.org/officeDocument/2006/relationships" xmlns:p="http://schemas.openxmlformats.org/presentationml/2006/main">
+  <p:cSld>
+    <p:spTree>
+      <p:nvGrpSpPr>
+        <p:cNvPr id="1" name=""/>
+        <p:cNvGrpSpPr/>
+        <p:nvPr/>
+      </p:nvGrpSpPr>
+      <p:grpSpPr>
+        <a:xfrm>
+          <a:off x="0" y="0"/>
+          <a:ext cx="0" cy="0"/>
+          <a:chOff x="0" y="0"/>
+          <a:chExt cx="0" cy="0"/>
+        </a:xfrm>
+      </p:grpSpPr>
+      <p:sp>
+        <p:nvSpPr>
           <p:cNvPr id="2" name="Title 1"/>
           <p:cNvSpPr>
             <a:spLocks noGrp="1"/>
@@ -4302,7 +4397,7 @@
 </p:sld>
 </file>
 
-<file path=ppt/slides/slide11.xml><?xml version="1.0" encoding="utf-8"?>
+<file path=ppt/slides/slide12.xml><?xml version="1.0" encoding="utf-8"?>
 <p:sld xmlns:a="http://schemas.openxmlformats.org/drawingml/2006/main" xmlns:r="http://schemas.openxmlformats.org/officeDocument/2006/relationships" xmlns:p="http://schemas.openxmlformats.org/presentationml/2006/main">
   <p:cSld>
     <p:spTree>

</xml_diff>